<commit_message>
day 74, 75, 76
</commit_message>
<xml_diff>
--- a/_PowerPoints/2nd Semester/Unit 9 Logarithms/Algebra_4_Day_076 7.5 Exponential and Log Equations.pptx
+++ b/_PowerPoints/2nd Semester/Unit 9 Logarithms/Algebra_4_Day_076 7.5 Exponential and Log Equations.pptx
@@ -291,7 +291,7 @@
             <a:fld id="{87DE6118-2437-4B30-8E3C-4D2BE6020583}" type="datetimeFigureOut">
               <a:rPr lang="en-US" dirty="0"/>
               <a:pPr/>
-              <a:t>4/17/2018</a:t>
+              <a:t>4/30/2018</a:t>
             </a:fld>
             <a:endParaRPr lang="en-US" dirty="0"/>
           </a:p>
@@ -617,7 +617,7 @@
           <a:p>
             <a:fld id="{87DE6118-2437-4B30-8E3C-4D2BE6020583}" type="datetimeFigureOut">
               <a:rPr lang="en-US" dirty="0"/>
-              <a:t>4/17/2018</a:t>
+              <a:t>4/30/2018</a:t>
             </a:fld>
             <a:endParaRPr lang="en-US" dirty="0"/>
           </a:p>
@@ -792,7 +792,7 @@
           <a:p>
             <a:fld id="{87DE6118-2437-4B30-8E3C-4D2BE6020583}" type="datetimeFigureOut">
               <a:rPr lang="en-US" dirty="0"/>
-              <a:t>4/17/2018</a:t>
+              <a:t>4/30/2018</a:t>
             </a:fld>
             <a:endParaRPr lang="en-US" dirty="0"/>
           </a:p>
@@ -957,7 +957,7 @@
           <a:p>
             <a:fld id="{87DE6118-2437-4B30-8E3C-4D2BE6020583}" type="datetimeFigureOut">
               <a:rPr lang="en-US" dirty="0"/>
-              <a:t>4/17/2018</a:t>
+              <a:t>4/30/2018</a:t>
             </a:fld>
             <a:endParaRPr lang="en-US" dirty="0"/>
           </a:p>
@@ -1230,7 +1230,7 @@
             <a:fld id="{87DE6118-2437-4B30-8E3C-4D2BE6020583}" type="datetimeFigureOut">
               <a:rPr lang="en-US" dirty="0"/>
               <a:pPr/>
-              <a:t>4/17/2018</a:t>
+              <a:t>4/30/2018</a:t>
             </a:fld>
             <a:endParaRPr lang="en-US" dirty="0"/>
           </a:p>
@@ -1620,7 +1620,7 @@
           <a:p>
             <a:fld id="{87DE6118-2437-4B30-8E3C-4D2BE6020583}" type="datetimeFigureOut">
               <a:rPr lang="en-US" dirty="0"/>
-              <a:t>4/17/2018</a:t>
+              <a:t>4/30/2018</a:t>
             </a:fld>
             <a:endParaRPr lang="en-US" dirty="0"/>
           </a:p>
@@ -2092,7 +2092,7 @@
           <a:p>
             <a:fld id="{87DE6118-2437-4B30-8E3C-4D2BE6020583}" type="datetimeFigureOut">
               <a:rPr lang="en-US" dirty="0"/>
-              <a:t>4/17/2018</a:t>
+              <a:t>4/30/2018</a:t>
             </a:fld>
             <a:endParaRPr lang="en-US" dirty="0"/>
           </a:p>
@@ -2205,7 +2205,7 @@
           <a:p>
             <a:fld id="{87DE6118-2437-4B30-8E3C-4D2BE6020583}" type="datetimeFigureOut">
               <a:rPr lang="en-US" dirty="0"/>
-              <a:t>4/17/2018</a:t>
+              <a:t>4/30/2018</a:t>
             </a:fld>
             <a:endParaRPr lang="en-US" dirty="0"/>
           </a:p>
@@ -2295,7 +2295,7 @@
           <a:p>
             <a:fld id="{87DE6118-2437-4B30-8E3C-4D2BE6020583}" type="datetimeFigureOut">
               <a:rPr lang="en-US" dirty="0"/>
-              <a:t>4/17/2018</a:t>
+              <a:t>4/30/2018</a:t>
             </a:fld>
             <a:endParaRPr lang="en-US" dirty="0"/>
           </a:p>
@@ -2637,7 +2637,7 @@
             <a:fld id="{87DE6118-2437-4B30-8E3C-4D2BE6020583}" type="datetimeFigureOut">
               <a:rPr lang="en-US" dirty="0"/>
               <a:pPr/>
-              <a:t>4/17/2018</a:t>
+              <a:t>4/30/2018</a:t>
             </a:fld>
             <a:endParaRPr lang="en-US" dirty="0"/>
           </a:p>
@@ -3022,7 +3022,7 @@
             <a:fld id="{87DE6118-2437-4B30-8E3C-4D2BE6020583}" type="datetimeFigureOut">
               <a:rPr lang="en-US" dirty="0"/>
               <a:pPr/>
-              <a:t>4/17/2018</a:t>
+              <a:t>4/30/2018</a:t>
             </a:fld>
             <a:endParaRPr lang="en-US" dirty="0"/>
           </a:p>
@@ -3297,7 +3297,7 @@
             <a:fld id="{87DE6118-2437-4B30-8E3C-4D2BE6020583}" type="datetimeFigureOut">
               <a:rPr lang="en-US" dirty="0"/>
               <a:pPr/>
-              <a:t>4/17/2018</a:t>
+              <a:t>4/30/2018</a:t>
             </a:fld>
             <a:endParaRPr lang="en-US" dirty="0"/>
           </a:p>
@@ -4026,17 +4026,28 @@
               <a:buNone/>
             </a:pPr>
             <a:r>
-              <a:rPr lang="en-US" sz="3400" dirty="0" smtClean="0"/>
-              <a:t>Page 457 # 1–9, 13–27(odd)</a:t>
-            </a:r>
-          </a:p>
-          <a:p>
-            <a:pPr marL="0" indent="0">
-              <a:buNone/>
-            </a:pPr>
+              <a:rPr lang="en-US" sz="3400" dirty="0"/>
+              <a:t>Page </a:t>
+            </a:r>
+            <a:r>
+              <a:rPr lang="en-US" sz="3400"/>
+              <a:t>473 </a:t>
+            </a:r>
             <a:r>
               <a:rPr lang="en-US" sz="3400" smtClean="0"/>
-              <a:t>Page 465 # 1–4, 30–33    </a:t>
+              <a:t>#10-14 (even), 18, 31–41 </a:t>
+            </a:r>
+            <a:r>
+              <a:rPr lang="en-US" sz="3400" dirty="0"/>
+              <a:t>(</a:t>
+            </a:r>
+            <a:r>
+              <a:rPr lang="en-US" sz="3400"/>
+              <a:t>odd</a:t>
+            </a:r>
+            <a:r>
+              <a:rPr lang="en-US" sz="3400" smtClean="0"/>
+              <a:t>), 49</a:t>
             </a:r>
             <a:endParaRPr lang="en-US" sz="3400" dirty="0"/>
           </a:p>

</xml_diff>